<commit_message>
Part4 report & README finished
</commit_message>
<xml_diff>
--- a/Report-Part4.pptx
+++ b/Report-Part4.pptx
@@ -117,6 +117,11 @@
       </a:defRPr>
     </a:lvl9pPr>
   </p:defaultTextStyle>
+  <p:extLst>
+    <p:ext uri="{EFAFB233-063F-42B5-8137-9DF3F51BA10A}">
+      <p15:sldGuideLst xmlns:p15="http://schemas.microsoft.com/office/powerpoint/2012/main"/>
+    </p:ext>
+  </p:extLst>
 </p:presentation>
 </file>
 
@@ -5840,7 +5845,7 @@
         <p:spPr>
           <a:xfrm>
             <a:off x="7651200" y="3535126"/>
-            <a:ext cx="4540800" cy="2862322"/>
+            <a:ext cx="4540800" cy="2585323"/>
           </a:xfrm>
           <a:prstGeom prst="rect">
             <a:avLst/>
@@ -5861,7 +5866,7 @@
           <a:p>
             <a:r>
               <a:rPr lang="en-US" altLang="zh-TW" dirty="0"/>
-              <a:t>Create election : queen(A B C) →</a:t>
+              <a:t>Create election : queen(D E F) →</a:t>
             </a:r>
           </a:p>
           <a:p>
@@ -5879,13 +5884,13 @@
           <a:p>
             <a:r>
               <a:rPr lang="en-US" altLang="zh-TW" dirty="0"/>
-              <a:t>a1 vote for A →</a:t>
+              <a:t>a1 vote for D →</a:t>
             </a:r>
           </a:p>
           <a:p>
             <a:r>
               <a:rPr lang="en-US" altLang="zh-TW" dirty="0"/>
-              <a:t>a2 vote for B →</a:t>
+              <a:t>a2 vote for E →</a:t>
             </a:r>
           </a:p>
           <a:p>
@@ -5903,13 +5908,7 @@
           <a:p>
             <a:r>
               <a:rPr lang="en-US" altLang="zh-TW" dirty="0"/>
-              <a:t>a1 login, connect to Server 1 →</a:t>
-            </a:r>
-          </a:p>
-          <a:p>
-            <a:r>
-              <a:rPr lang="en-US" altLang="zh-TW" dirty="0"/>
-              <a:t>Get result (A:1, B:1)</a:t>
+              <a:t>Get result (D:1, E:1)</a:t>
             </a:r>
           </a:p>
         </p:txBody>
@@ -6104,6 +6103,12 @@
             <a:r>
               <a:rPr lang="en-US" altLang="zh-TW" dirty="0"/>
               <a:t>YouTube : </a:t>
+            </a:r>
+            <a:r>
+              <a:rPr lang="en-US" altLang="zh-TW" dirty="0">
+                <a:hlinkClick r:id="rId3"/>
+              </a:rPr>
+              <a:t>https://youtu.be/eROVNXL8Ntw</a:t>
             </a:r>
             <a:endParaRPr lang="zh-TW" altLang="en-US" dirty="0"/>
           </a:p>

</xml_diff>